<commit_message>
vorige Änderungen jetzt auch in PP Nr. 5
</commit_message>
<xml_diff>
--- a/Abschlusspräsentation-5.pptx
+++ b/Abschlusspräsentation-5.pptx
@@ -206,7 +206,7 @@
           <a:p>
             <a:fld id="{A57D27A1-214A-458A-A3B7-807F6FF442B2}" type="datetimeFigureOut">
               <a:rPr lang="de-DE" smtClean="0"/>
-              <a:t>09.06.20</a:t>
+              <a:t>09.06.2020</a:t>
             </a:fld>
             <a:endParaRPr lang="de-DE"/>
           </a:p>
@@ -1259,7 +1259,7 @@
           <a:p>
             <a:fld id="{B03AB384-284A-4429-AFB5-F1724AA94F76}" type="datetimeFigureOut">
               <a:rPr lang="de-DE" smtClean="0"/>
-              <a:t>09.06.20</a:t>
+              <a:t>09.06.2020</a:t>
             </a:fld>
             <a:endParaRPr lang="de-DE"/>
           </a:p>
@@ -1457,7 +1457,7 @@
           <a:p>
             <a:fld id="{B03AB384-284A-4429-AFB5-F1724AA94F76}" type="datetimeFigureOut">
               <a:rPr lang="de-DE" smtClean="0"/>
-              <a:t>09.06.20</a:t>
+              <a:t>09.06.2020</a:t>
             </a:fld>
             <a:endParaRPr lang="de-DE"/>
           </a:p>
@@ -1665,7 +1665,7 @@
           <a:p>
             <a:fld id="{B03AB384-284A-4429-AFB5-F1724AA94F76}" type="datetimeFigureOut">
               <a:rPr lang="de-DE" smtClean="0"/>
-              <a:t>09.06.20</a:t>
+              <a:t>09.06.2020</a:t>
             </a:fld>
             <a:endParaRPr lang="de-DE"/>
           </a:p>
@@ -1863,7 +1863,7 @@
           <a:p>
             <a:fld id="{B03AB384-284A-4429-AFB5-F1724AA94F76}" type="datetimeFigureOut">
               <a:rPr lang="de-DE" smtClean="0"/>
-              <a:t>09.06.20</a:t>
+              <a:t>09.06.2020</a:t>
             </a:fld>
             <a:endParaRPr lang="de-DE"/>
           </a:p>
@@ -2138,7 +2138,7 @@
           <a:p>
             <a:fld id="{B03AB384-284A-4429-AFB5-F1724AA94F76}" type="datetimeFigureOut">
               <a:rPr lang="de-DE" smtClean="0"/>
-              <a:t>09.06.20</a:t>
+              <a:t>09.06.2020</a:t>
             </a:fld>
             <a:endParaRPr lang="de-DE"/>
           </a:p>
@@ -2403,7 +2403,7 @@
           <a:p>
             <a:fld id="{B03AB384-284A-4429-AFB5-F1724AA94F76}" type="datetimeFigureOut">
               <a:rPr lang="de-DE" smtClean="0"/>
-              <a:t>09.06.20</a:t>
+              <a:t>09.06.2020</a:t>
             </a:fld>
             <a:endParaRPr lang="de-DE"/>
           </a:p>
@@ -2815,7 +2815,7 @@
           <a:p>
             <a:fld id="{B03AB384-284A-4429-AFB5-F1724AA94F76}" type="datetimeFigureOut">
               <a:rPr lang="de-DE" smtClean="0"/>
-              <a:t>09.06.20</a:t>
+              <a:t>09.06.2020</a:t>
             </a:fld>
             <a:endParaRPr lang="de-DE"/>
           </a:p>
@@ -2956,7 +2956,7 @@
           <a:p>
             <a:fld id="{B03AB384-284A-4429-AFB5-F1724AA94F76}" type="datetimeFigureOut">
               <a:rPr lang="de-DE" smtClean="0"/>
-              <a:t>09.06.20</a:t>
+              <a:t>09.06.2020</a:t>
             </a:fld>
             <a:endParaRPr lang="de-DE"/>
           </a:p>
@@ -3069,7 +3069,7 @@
           <a:p>
             <a:fld id="{B03AB384-284A-4429-AFB5-F1724AA94F76}" type="datetimeFigureOut">
               <a:rPr lang="de-DE" smtClean="0"/>
-              <a:t>09.06.20</a:t>
+              <a:t>09.06.2020</a:t>
             </a:fld>
             <a:endParaRPr lang="de-DE"/>
           </a:p>
@@ -3380,7 +3380,7 @@
           <a:p>
             <a:fld id="{B03AB384-284A-4429-AFB5-F1724AA94F76}" type="datetimeFigureOut">
               <a:rPr lang="de-DE" smtClean="0"/>
-              <a:t>09.06.20</a:t>
+              <a:t>09.06.2020</a:t>
             </a:fld>
             <a:endParaRPr lang="de-DE"/>
           </a:p>
@@ -3668,7 +3668,7 @@
           <a:p>
             <a:fld id="{B03AB384-284A-4429-AFB5-F1724AA94F76}" type="datetimeFigureOut">
               <a:rPr lang="de-DE" smtClean="0"/>
-              <a:t>09.06.20</a:t>
+              <a:t>09.06.2020</a:t>
             </a:fld>
             <a:endParaRPr lang="de-DE"/>
           </a:p>
@@ -3909,7 +3909,7 @@
           <a:p>
             <a:fld id="{B03AB384-284A-4429-AFB5-F1724AA94F76}" type="datetimeFigureOut">
               <a:rPr lang="de-DE" smtClean="0"/>
-              <a:t>09.06.20</a:t>
+              <a:t>09.06.2020</a:t>
             </a:fld>
             <a:endParaRPr lang="de-DE"/>
           </a:p>
@@ -5865,7 +5865,7 @@
         </p:spPr>
         <p:txBody>
           <a:bodyPr anchor="ctr">
-            <a:normAutofit lnSpcReduction="10000"/>
+            <a:normAutofit fontScale="92500" lnSpcReduction="20000"/>
           </a:bodyPr>
           <a:lstStyle/>
           <a:p>
@@ -7112,10 +7112,10 @@
       </p:graphicFrame>
       <p:graphicFrame>
         <p:nvGraphicFramePr>
-          <p:cNvPr id="6" name="Tabelle 6">
-            <a:extLst>
-              <a:ext uri="{FF2B5EF4-FFF2-40B4-BE49-F238E27FC236}">
-                <a16:creationId xmlns:a16="http://schemas.microsoft.com/office/drawing/2014/main" id="{9471A292-4436-4163-8FE5-EF80689F0CD5}"/>
+          <p:cNvPr id="7" name="Tabelle 6">
+            <a:extLst>
+              <a:ext uri="{FF2B5EF4-FFF2-40B4-BE49-F238E27FC236}">
+                <a16:creationId xmlns:a16="http://schemas.microsoft.com/office/drawing/2014/main" id="{1D33A7EA-5355-4138-AB43-0C9A9FDED537}"/>
               </a:ext>
             </a:extLst>
           </p:cNvPr>
@@ -7125,7 +7125,7 @@
           <p:nvPr>
             <p:extLst>
               <p:ext uri="{D42A27DB-BD31-4B8C-83A1-F6EECF244321}">
-                <p14:modId xmlns:p14="http://schemas.microsoft.com/office/powerpoint/2010/main" val="906485579"/>
+                <p14:modId xmlns:p14="http://schemas.microsoft.com/office/powerpoint/2010/main" val="1627294985"/>
               </p:ext>
             </p:extLst>
           </p:nvPr>
@@ -7189,7 +7189,7 @@
                     <a:p>
                       <a:pPr algn="ctr"/>
                       <a:r>
-                        <a:rPr lang="de-DE" sz="2000" dirty="0"/>
+                        <a:rPr lang="de-DE" sz="2000" b="1" dirty="0"/>
                         <a:t>Training-MAPE</a:t>
                       </a:r>
                     </a:p>
@@ -7203,11 +7203,11 @@
                     <a:p>
                       <a:pPr algn="ctr"/>
                       <a:r>
-                        <a:rPr lang="de-DE" sz="2000" dirty="0" err="1"/>
+                        <a:rPr lang="de-DE" sz="2000" b="1" dirty="0" err="1"/>
                         <a:t>Testing</a:t>
                       </a:r>
                       <a:r>
-                        <a:rPr lang="de-DE" sz="2000" dirty="0"/>
+                        <a:rPr lang="de-DE" sz="2000" b="1" dirty="0"/>
                         <a:t>-MAPE</a:t>
                       </a:r>
                     </a:p>
@@ -7256,10 +7256,14 @@
                     <a:p>
                       <a:pPr algn="ctr"/>
                       <a:r>
+                        <a:rPr lang="de-DE" sz="2000" b="1" dirty="0"/>
+                        <a:t>0.2025104 </a:t>
+                      </a:r>
+                      <a:r>
                         <a:rPr lang="de-DE" sz="2000" b="1" dirty="0">
                           <a:effectLst/>
                         </a:rPr>
-                        <a:t>0.2026221 </a:t>
+                        <a:t> </a:t>
                       </a:r>
                       <a:r>
                         <a:rPr lang="de-DE" sz="2000" b="1" dirty="0"/>
@@ -7276,12 +7280,9 @@
                     <a:p>
                       <a:pPr algn="ctr"/>
                       <a:r>
-                        <a:rPr lang="de-DE" sz="2000" b="1" dirty="0">
-                          <a:effectLst/>
-                        </a:rPr>
-                        <a:t>0.2077283</a:t>
+                        <a:rPr lang="de-DE" sz="2000" b="1" dirty="0"/>
+                        <a:t>0.2188214</a:t>
                       </a:r>
-                      <a:endParaRPr lang="de-DE" sz="2000" b="1" dirty="0"/>
                     </a:p>
                   </a:txBody>
                   <a:tcPr/>
@@ -7331,14 +7332,8 @@
                     <a:p>
                       <a:pPr algn="ctr"/>
                       <a:r>
-                        <a:rPr lang="de-DE" sz="2000" b="1" dirty="0">
-                          <a:effectLst/>
-                        </a:rPr>
-                        <a:t>0.1331242 </a:t>
-                      </a:r>
-                      <a:r>
                         <a:rPr lang="de-DE" sz="2000" b="1" dirty="0"/>
-                        <a:t> </a:t>
+                        <a:t>0.1298205 </a:t>
                       </a:r>
                     </a:p>
                   </a:txBody>
@@ -7351,12 +7346,9 @@
                     <a:p>
                       <a:pPr algn="ctr"/>
                       <a:r>
-                        <a:rPr lang="de-DE" sz="2000" b="1" dirty="0">
-                          <a:effectLst/>
-                        </a:rPr>
-                        <a:t>0.1399899</a:t>
+                        <a:rPr lang="de-DE" sz="2000" b="1" dirty="0"/>
+                        <a:t>0.1378727</a:t>
                       </a:r>
-                      <a:endParaRPr lang="de-DE" sz="2000" b="1" dirty="0"/>
                     </a:p>
                   </a:txBody>
                   <a:tcPr/>
@@ -7406,10 +7398,14 @@
                     <a:p>
                       <a:pPr algn="ctr"/>
                       <a:r>
+                        <a:rPr lang="de-DE" sz="2000" b="1" dirty="0"/>
+                        <a:t>0.1712652 </a:t>
+                      </a:r>
+                      <a:r>
                         <a:rPr lang="de-DE" sz="2000" b="1" dirty="0">
                           <a:effectLst/>
                         </a:rPr>
-                        <a:t>0.1731559 </a:t>
+                        <a:t> </a:t>
                       </a:r>
                       <a:r>
                         <a:rPr lang="de-DE" sz="2000" b="1" dirty="0"/>
@@ -7426,12 +7422,9 @@
                     <a:p>
                       <a:pPr algn="ctr"/>
                       <a:r>
-                        <a:rPr lang="de-DE" sz="2000" b="1" dirty="0">
-                          <a:effectLst/>
-                        </a:rPr>
-                        <a:t>0.2112044</a:t>
+                        <a:rPr lang="de-DE" sz="2000" b="1" dirty="0"/>
+                        <a:t>0.2085662</a:t>
                       </a:r>
-                      <a:endParaRPr lang="de-DE" sz="2000" b="1" dirty="0"/>
                     </a:p>
                   </a:txBody>
                   <a:tcPr/>
@@ -7481,12 +7474,9 @@
                     <a:p>
                       <a:pPr algn="ctr"/>
                       <a:r>
-                        <a:rPr lang="de-DE" sz="2000" b="1" dirty="0">
-                          <a:effectLst/>
-                        </a:rPr>
-                        <a:t>0.2246668 </a:t>
+                        <a:rPr lang="de-DE" sz="2000" b="1" dirty="0"/>
+                        <a:t>0.2235303 </a:t>
                       </a:r>
-                      <a:endParaRPr lang="de-DE" sz="2000" b="1" dirty="0"/>
                     </a:p>
                   </a:txBody>
                   <a:tcPr/>
@@ -7498,12 +7488,9 @@
                     <a:p>
                       <a:pPr algn="ctr"/>
                       <a:r>
-                        <a:rPr lang="de-DE" sz="2000" b="1" dirty="0">
-                          <a:effectLst/>
-                        </a:rPr>
-                        <a:t>0.2475453</a:t>
+                        <a:rPr lang="de-DE" sz="2000" b="1" dirty="0"/>
+                        <a:t>0.2450586</a:t>
                       </a:r>
-                      <a:endParaRPr lang="de-DE" sz="2000" b="1" dirty="0"/>
                     </a:p>
                   </a:txBody>
                   <a:tcPr/>
@@ -7553,14 +7540,8 @@
                     <a:p>
                       <a:pPr algn="ctr"/>
                       <a:r>
-                        <a:rPr lang="de-DE" sz="2000" b="1" dirty="0">
-                          <a:effectLst/>
-                        </a:rPr>
-                        <a:t>0.1426946 </a:t>
-                      </a:r>
-                      <a:r>
                         <a:rPr lang="de-DE" sz="2000" b="1" dirty="0"/>
-                        <a:t> </a:t>
+                        <a:t>0.1358742 </a:t>
                       </a:r>
                     </a:p>
                   </a:txBody>
@@ -7573,12 +7554,9 @@
                     <a:p>
                       <a:pPr algn="ctr"/>
                       <a:r>
-                        <a:rPr lang="de-DE" sz="2000" b="1" dirty="0">
-                          <a:effectLst/>
-                        </a:rPr>
-                        <a:t>0.1786739</a:t>
+                        <a:rPr lang="de-DE" sz="2000" b="1" dirty="0"/>
+                        <a:t>0.1715157</a:t>
                       </a:r>
-                      <a:endParaRPr lang="de-DE" sz="2000" b="1" dirty="0"/>
                     </a:p>
                   </a:txBody>
                   <a:tcPr/>
@@ -7628,12 +7606,9 @@
                     <a:p>
                       <a:pPr algn="ctr"/>
                       <a:r>
-                        <a:rPr lang="de-DE" sz="2000" b="1" dirty="0">
-                          <a:effectLst/>
-                        </a:rPr>
-                        <a:t>0.9201665 </a:t>
+                        <a:rPr lang="de-DE" sz="2000" b="1" dirty="0"/>
+                        <a:t>0.9120678 </a:t>
                       </a:r>
-                      <a:endParaRPr lang="de-DE" sz="2000" b="1" dirty="0"/>
                     </a:p>
                   </a:txBody>
                   <a:tcPr/>
@@ -7645,12 +7620,9 @@
                     <a:p>
                       <a:pPr algn="ctr"/>
                       <a:r>
-                        <a:rPr lang="de-DE" sz="2000" b="1" dirty="0">
-                          <a:effectLst/>
-                        </a:rPr>
-                        <a:t>0.9191404</a:t>
+                        <a:rPr lang="de-DE" sz="2000" b="1" dirty="0"/>
+                        <a:t>0.9213993</a:t>
                       </a:r>
-                      <a:endParaRPr lang="de-DE" sz="2000" b="1" dirty="0"/>
                     </a:p>
                   </a:txBody>
                   <a:tcPr/>

</xml_diff>